<commit_message>
Fixed bugs and added functionalities
</commit_message>
<xml_diff>
--- a/documentation/Project A-z handyman wk3.pptx
+++ b/documentation/Project A-z handyman wk3.pptx
@@ -6296,12 +6296,12 @@
           <a:p>
             <a:pPr lvl="1"/>
             <a:r>
-              <a:rPr lang="en-US"/>
-              <a:t>	App</a:t>
+              <a:rPr lang="en-US" dirty="0"/>
+              <a:t>	</a:t>
             </a:r>
             <a:r>
               <a:rPr lang="en-US" dirty="0" err="1"/>
-              <a:t>.vue</a:t>
+              <a:t>App.vue</a:t>
             </a:r>
             <a:r>
               <a:rPr lang="en-US" dirty="0"/>

</xml_diff>